<commit_message>
Update Statistics In FRC - FIRST Bootcamp 2019.pptx
</commit_message>
<xml_diff>
--- a/Statistics In FRC - FIRST Bootcamp 2019.pptx
+++ b/Statistics In FRC - FIRST Bootcamp 2019.pptx
@@ -4927,7 +4927,7 @@
           <a:p>
             <a:fld id="{CA0B255D-38DB-406E-9069-1E004361B737}" type="datetimeFigureOut">
               <a:rPr lang="en-US" smtClean="0"/>
-              <a:t>12/7/2019</a:t>
+              <a:t>12/8/2019</a:t>
             </a:fld>
             <a:endParaRPr lang="en-US"/>
           </a:p>
@@ -5189,7 +5189,7 @@
           <a:p>
             <a:fld id="{CA0B255D-38DB-406E-9069-1E004361B737}" type="datetimeFigureOut">
               <a:rPr lang="en-US" smtClean="0"/>
-              <a:t>12/7/2019</a:t>
+              <a:t>12/8/2019</a:t>
             </a:fld>
             <a:endParaRPr lang="en-US"/>
           </a:p>
@@ -5424,7 +5424,7 @@
           <a:p>
             <a:fld id="{CA0B255D-38DB-406E-9069-1E004361B737}" type="datetimeFigureOut">
               <a:rPr lang="en-US" smtClean="0"/>
-              <a:t>12/7/2019</a:t>
+              <a:t>12/8/2019</a:t>
             </a:fld>
             <a:endParaRPr lang="en-US"/>
           </a:p>
@@ -5664,7 +5664,7 @@
           <a:p>
             <a:fld id="{CA0B255D-38DB-406E-9069-1E004361B737}" type="datetimeFigureOut">
               <a:rPr lang="en-US" smtClean="0"/>
-              <a:t>12/7/2019</a:t>
+              <a:t>12/8/2019</a:t>
             </a:fld>
             <a:endParaRPr lang="en-US"/>
           </a:p>
@@ -5971,7 +5971,7 @@
           <a:p>
             <a:fld id="{CA0B255D-38DB-406E-9069-1E004361B737}" type="datetimeFigureOut">
               <a:rPr lang="en-US" smtClean="0"/>
-              <a:t>12/7/2019</a:t>
+              <a:t>12/8/2019</a:t>
             </a:fld>
             <a:endParaRPr lang="en-US"/>
           </a:p>
@@ -6273,7 +6273,7 @@
           <a:p>
             <a:fld id="{CA0B255D-38DB-406E-9069-1E004361B737}" type="datetimeFigureOut">
               <a:rPr lang="en-US" smtClean="0"/>
-              <a:t>12/7/2019</a:t>
+              <a:t>12/8/2019</a:t>
             </a:fld>
             <a:endParaRPr lang="en-US"/>
           </a:p>
@@ -6695,7 +6695,7 @@
           <a:p>
             <a:fld id="{CA0B255D-38DB-406E-9069-1E004361B737}" type="datetimeFigureOut">
               <a:rPr lang="en-US" smtClean="0"/>
-              <a:t>12/7/2019</a:t>
+              <a:t>12/8/2019</a:t>
             </a:fld>
             <a:endParaRPr lang="en-US"/>
           </a:p>
@@ -6857,7 +6857,7 @@
           <a:p>
             <a:fld id="{CA0B255D-38DB-406E-9069-1E004361B737}" type="datetimeFigureOut">
               <a:rPr lang="en-US" smtClean="0"/>
-              <a:t>12/7/2019</a:t>
+              <a:t>12/8/2019</a:t>
             </a:fld>
             <a:endParaRPr lang="en-US"/>
           </a:p>
@@ -6952,7 +6952,7 @@
           <a:p>
             <a:fld id="{CA0B255D-38DB-406E-9069-1E004361B737}" type="datetimeFigureOut">
               <a:rPr lang="en-US" smtClean="0"/>
-              <a:t>12/7/2019</a:t>
+              <a:t>12/8/2019</a:t>
             </a:fld>
             <a:endParaRPr lang="en-US"/>
           </a:p>
@@ -7330,7 +7330,7 @@
           <a:p>
             <a:fld id="{CA0B255D-38DB-406E-9069-1E004361B737}" type="datetimeFigureOut">
               <a:rPr lang="en-US" smtClean="0"/>
-              <a:t>12/7/2019</a:t>
+              <a:t>12/8/2019</a:t>
             </a:fld>
             <a:endParaRPr lang="en-US"/>
           </a:p>
@@ -7619,7 +7619,7 @@
           <a:p>
             <a:fld id="{CA0B255D-38DB-406E-9069-1E004361B737}" type="datetimeFigureOut">
               <a:rPr lang="en-US" smtClean="0"/>
-              <a:t>12/7/2019</a:t>
+              <a:t>12/8/2019</a:t>
             </a:fld>
             <a:endParaRPr lang="en-US"/>
           </a:p>
@@ -7830,7 +7830,7 @@
           <a:p>
             <a:fld id="{CA0B255D-38DB-406E-9069-1E004361B737}" type="datetimeFigureOut">
               <a:rPr lang="en-US" smtClean="0"/>
-              <a:t>12/7/2019</a:t>
+              <a:t>12/8/2019</a:t>
             </a:fld>
             <a:endParaRPr lang="en-US"/>
           </a:p>
@@ -9462,7 +9462,7 @@
             </a:br>
             <a:r>
               <a:rPr lang="en-US" dirty="0"/>
-              <a:t>“Variance adjustment” in FRC</a:t>
+              <a:t>“Variance adjustment” in FRC (not exhaustive lists)</a:t>
             </a:r>
           </a:p>
         </p:txBody>
@@ -9881,7 +9881,7 @@
             <a:pPr lvl="1"/>
             <a:r>
               <a:rPr lang="en-US" dirty="0"/>
-              <a:t>d is the difference in skill or expected score between your alliances</a:t>
+              <a:t>d is the difference in skill or expected score between your alliances, to calculate this, sum all opponent ratings and subtract out all ratings of the teams on your alliance. </a:t>
             </a:r>
           </a:p>
           <a:p>
@@ -10182,8 +10182,8 @@
         </p:blipFill>
         <p:spPr bwMode="auto">
           <a:xfrm>
-            <a:off x="3230902" y="1912802"/>
-            <a:ext cx="6034995" cy="4021468"/>
+            <a:off x="3639679" y="2973076"/>
+            <a:ext cx="4989732" cy="3324948"/>
           </a:xfrm>
           <a:prstGeom prst="rect">
             <a:avLst/>
@@ -10214,7 +10214,7 @@
         </p:nvSpPr>
         <p:spPr>
           <a:xfrm>
-            <a:off x="3937519" y="6074229"/>
+            <a:off x="3792561" y="6155844"/>
             <a:ext cx="4683968" cy="369332"/>
           </a:xfrm>
           <a:prstGeom prst="rect">
@@ -10230,7 +10230,7 @@
           <a:p>
             <a:r>
               <a:rPr lang="en-US" dirty="0"/>
-              <a:t>Blue alliance “strength” – red alliance “strength”</a:t>
+              <a:t>blue alliance “strength” – red alliance “strength”</a:t>
             </a:r>
           </a:p>
         </p:txBody>
@@ -10249,7 +10249,7 @@
         </p:nvSpPr>
         <p:spPr>
           <a:xfrm rot="16200000">
-            <a:off x="1758416" y="3573820"/>
+            <a:off x="2167193" y="4362714"/>
             <a:ext cx="2944973" cy="369332"/>
           </a:xfrm>
           <a:prstGeom prst="rect">
@@ -10266,6 +10266,55 @@
             <a:r>
               <a:rPr lang="en-US" dirty="0"/>
               <a:t>Blue alliance win probability</a:t>
+            </a:r>
+          </a:p>
+        </p:txBody>
+      </p:sp>
+      <p:sp>
+        <p:nvSpPr>
+          <p:cNvPr id="3" name="TextBox 2">
+            <a:extLst>
+              <a:ext uri="{FF2B5EF4-FFF2-40B4-BE49-F238E27FC236}">
+                <a16:creationId xmlns:a16="http://schemas.microsoft.com/office/drawing/2014/main" id="{32389F85-CABB-47A8-8B43-865E1F15464F}"/>
+              </a:ext>
+            </a:extLst>
+          </p:cNvPr>
+          <p:cNvSpPr txBox="1"/>
+          <p:nvPr/>
+        </p:nvSpPr>
+        <p:spPr>
+          <a:xfrm>
+            <a:off x="824753" y="1954306"/>
+            <a:ext cx="10345271" cy="1200329"/>
+          </a:xfrm>
+          <a:prstGeom prst="rect">
+            <a:avLst/>
+          </a:prstGeom>
+          <a:noFill/>
+        </p:spPr>
+        <p:txBody>
+          <a:bodyPr wrap="square" rtlCol="0">
+            <a:spAutoFit/>
+          </a:bodyPr>
+          <a:lstStyle/>
+          <a:p>
+            <a:pPr marL="285750" indent="-285750">
+              <a:buFont typeface="Arial" panose="020B0604020202020204" pitchFamily="34" charset="0"/>
+              <a:buChar char="•"/>
+            </a:pPr>
+            <a:r>
+              <a:rPr lang="en-US" dirty="0"/>
+              <a:t>The previous formula is called a logistic function, which essentially just turns a linear “skill” difference into a non-linear probability function as shown below (x-axis units are arbitrary). </a:t>
+            </a:r>
+          </a:p>
+          <a:p>
+            <a:pPr marL="285750" indent="-285750">
+              <a:buFont typeface="Arial" panose="020B0604020202020204" pitchFamily="34" charset="0"/>
+              <a:buChar char="•"/>
+            </a:pPr>
+            <a:r>
+              <a:rPr lang="en-US" dirty="0"/>
+              <a:t>As you can see, when the red alliance is much stronger, blue WP -&gt; 0%, when alliances are even, blue WP = 50%, and when blue alliance is much stronger, blue WP -&gt; 100%. </a:t>
             </a:r>
           </a:p>
         </p:txBody>
@@ -10814,6 +10863,41 @@
           </a:prstGeom>
         </p:spPr>
       </p:pic>
+      <p:sp>
+        <p:nvSpPr>
+          <p:cNvPr id="3" name="TextBox 2">
+            <a:extLst>
+              <a:ext uri="{FF2B5EF4-FFF2-40B4-BE49-F238E27FC236}">
+                <a16:creationId xmlns:a16="http://schemas.microsoft.com/office/drawing/2014/main" id="{EFAAC928-E452-4598-ABC9-1EE7ECA02497}"/>
+              </a:ext>
+            </a:extLst>
+          </p:cNvPr>
+          <p:cNvSpPr txBox="1"/>
+          <p:nvPr/>
+        </p:nvSpPr>
+        <p:spPr>
+          <a:xfrm>
+            <a:off x="663388" y="1882588"/>
+            <a:ext cx="10766612" cy="646331"/>
+          </a:xfrm>
+          <a:prstGeom prst="rect">
+            <a:avLst/>
+          </a:prstGeom>
+          <a:noFill/>
+        </p:spPr>
+        <p:txBody>
+          <a:bodyPr wrap="square" rtlCol="0">
+            <a:spAutoFit/>
+          </a:bodyPr>
+          <a:lstStyle/>
+          <a:p>
+            <a:r>
+              <a:rPr lang="en-US" dirty="0"/>
+              <a:t>Here’s a graph showing a hypothetical scouting data total points estimate versus calculated contribution to total points for the same teams. Note the strong but imperfect correlation between these two methods. </a:t>
+            </a:r>
+          </a:p>
+        </p:txBody>
+      </p:sp>
     </p:spTree>
     <p:extLst>
       <p:ext uri="{BB962C8B-B14F-4D97-AF65-F5344CB8AC3E}">
@@ -10902,6 +10986,41 @@
           </a:prstGeom>
         </p:spPr>
       </p:pic>
+      <p:sp>
+        <p:nvSpPr>
+          <p:cNvPr id="4" name="TextBox 3">
+            <a:extLst>
+              <a:ext uri="{FF2B5EF4-FFF2-40B4-BE49-F238E27FC236}">
+                <a16:creationId xmlns:a16="http://schemas.microsoft.com/office/drawing/2014/main" id="{DA3106E9-2167-4FA6-8476-E032A12ED6FE}"/>
+              </a:ext>
+            </a:extLst>
+          </p:cNvPr>
+          <p:cNvSpPr txBox="1"/>
+          <p:nvPr/>
+        </p:nvSpPr>
+        <p:spPr>
+          <a:xfrm>
+            <a:off x="663388" y="1882588"/>
+            <a:ext cx="10766612" cy="646331"/>
+          </a:xfrm>
+          <a:prstGeom prst="rect">
+            <a:avLst/>
+          </a:prstGeom>
+          <a:noFill/>
+        </p:spPr>
+        <p:txBody>
+          <a:bodyPr wrap="square" rtlCol="0">
+            <a:spAutoFit/>
+          </a:bodyPr>
+          <a:lstStyle/>
+          <a:p>
+            <a:r>
+              <a:rPr lang="en-US" dirty="0"/>
+              <a:t>If I were looking at this graph, these are the teams that would stand out to me. There is a good chance these teams are doing something that is captured in their calculated contributions that the scouting data is not seeing. </a:t>
+            </a:r>
+          </a:p>
+        </p:txBody>
+      </p:sp>
     </p:spTree>
     <p:extLst>
       <p:ext uri="{BB962C8B-B14F-4D97-AF65-F5344CB8AC3E}">
@@ -11409,7 +11528,7 @@
           <a:p>
             <a:r>
               <a:rPr lang="en-US" dirty="0"/>
-              <a:t>What are some characteristics of high variance or low variance selections?</a:t>
+              <a:t>Alliance selection “variance adjustment” (not exhaustive list)</a:t>
             </a:r>
           </a:p>
         </p:txBody>
@@ -12164,7 +12283,7 @@
           <a:p>
             <a:r>
               <a:rPr lang="en-US" dirty="0"/>
-              <a:t>Simple algorithms using only match scores – 75%</a:t>
+              <a:t>Simple algorithms using only raw match scores (Elo/OPR) – 75%</a:t>
             </a:r>
           </a:p>
           <a:p>
@@ -12188,7 +12307,7 @@
           <a:p>
             <a:r>
               <a:rPr lang="en-US" dirty="0"/>
-              <a:t>Human predictions from someone who watches a lot of matches and has detailed scouting data on hand – 85%</a:t>
+              <a:t>Predictions from someone who watches a lot of matches and also has detailed scouting data on hand – 85%</a:t>
             </a:r>
           </a:p>
           <a:p>
@@ -13003,7 +13122,7 @@
           <a:p>
             <a:r>
               <a:rPr lang="en-US" dirty="0"/>
-              <a:t>That’s all folks</a:t>
+              <a:t>That’s all folks (for this part of the presentation)</a:t>
             </a:r>
           </a:p>
         </p:txBody>
@@ -13545,7 +13664,17 @@
           <a:p>
             <a:r>
               <a:rPr lang="en-US" dirty="0"/>
-              <a:t>We’ll be working through your worksheets for this method, so I recommend pulling out a calculator app and getting together in groups of 2-5</a:t>
+              <a:t>We’ll be working through </a:t>
+            </a:r>
+            <a:r>
+              <a:rPr lang="en-US" dirty="0">
+                <a:hlinkClick r:id="rId2"/>
+              </a:rPr>
+              <a:t>your worksheets </a:t>
+            </a:r>
+            <a:r>
+              <a:rPr lang="en-US" dirty="0"/>
+              <a:t>for this method, so I recommend pulling out a calculator app and getting together in groups of 2-5. </a:t>
             </a:r>
           </a:p>
           <a:p>
@@ -15035,6 +15164,22 @@
               <a:t>If we continue this process forever, this iterative method will converge to normal OPR. </a:t>
             </a:r>
           </a:p>
+          <a:p>
+            <a:r>
+              <a:rPr lang="en-US" dirty="0"/>
+              <a:t>If your results differ from the </a:t>
+            </a:r>
+            <a:r>
+              <a:rPr lang="en-US" dirty="0">
+                <a:hlinkClick r:id="rId2"/>
+              </a:rPr>
+              <a:t>completed worksheet</a:t>
+            </a:r>
+            <a:r>
+              <a:rPr lang="en-US" dirty="0"/>
+              <a:t>. Review that to see where you got off track. </a:t>
+            </a:r>
+          </a:p>
         </p:txBody>
       </p:sp>
       <p:pic>
@@ -15052,7 +15197,7 @@
           <p:nvPr/>
         </p:nvPicPr>
         <p:blipFill>
-          <a:blip r:embed="rId2"/>
+          <a:blip r:embed="rId3"/>
           <a:stretch>
             <a:fillRect/>
           </a:stretch>
@@ -24548,7 +24693,7 @@
             </a:r>
             <a:r>
               <a:rPr lang="en-US" dirty="0"/>
-              <a:t>” (if there’s an existing name for this let me know, I just made this one up). If I can get you to take one thing away from this presentation, it is that you should be thinking about variance in addition to averages when you are choosing strategies. </a:t>
+              <a:t>”. If I can get you to take one thing away from this presentation, it is that you should be thinking about variance in addition to averages when you are choosing strategies. </a:t>
             </a:r>
           </a:p>
         </p:txBody>

</xml_diff>